<commit_message>
Fixed glitch in recess calculation. Updated test data through test "today", 2017-07-25.
</commit_message>
<xml_diff>
--- a/DSSSchematics_2017Shiny_2.pptx
+++ b/DSSSchematics_2017Shiny_2.pptx
@@ -8329,9 +8329,10 @@
                     <a:p>
                       <a:pPr algn="ctr"/>
                       <a:r>
-                        <a:rPr lang="en-US" sz="800" dirty="0"/>
+                        <a:rPr lang="en-US" sz="800"/>
                         <a:t>10</a:t>
                       </a:r>
+                      <a:endParaRPr lang="en-US" sz="800" dirty="0"/>
                     </a:p>
                   </a:txBody>
                   <a:tcPr marL="27432" marR="27432" marT="18288" marB="18288" anchor="ctr">
@@ -9544,7 +9545,7 @@
         <p:spPr>
           <a:xfrm>
             <a:off x="1829189" y="2252778"/>
-            <a:ext cx="2366766" cy="769441"/>
+            <a:ext cx="2053565" cy="769441"/>
           </a:xfrm>
           <a:prstGeom prst="rect">
             <a:avLst/>

</xml_diff>